<commit_message>
updating TMR and DR
</commit_message>
<xml_diff>
--- a/Project 0 Presentation .pptx
+++ b/Project 0 Presentation .pptx
@@ -105,6 +105,11 @@
       </a:defRPr>
     </a:lvl9pPr>
   </p:defaultTextStyle>
+  <p:extLst>
+    <p:ext uri="{EFAFB233-063F-42B5-8137-9DF3F51BA10A}">
+      <p15:sldGuideLst xmlns:p15="http://schemas.microsoft.com/office/powerpoint/2012/main"/>
+    </p:ext>
+  </p:extLst>
 </p:presentation>
 </file>
 
@@ -3433,8 +3438,134 @@
           <a:p>
             <a:r>
               <a:rPr lang="en-US" dirty="0"/>
-              <a:t>                       Technologies Used </a:t>
-            </a:r>
+              <a:t>                     </a:t>
+            </a:r>
+            <a:r>
+              <a:rPr lang="en-US" b="1" dirty="0"/>
+              <a:t>Technologies Used</a:t>
+            </a:r>
+          </a:p>
+        </p:txBody>
+      </p:sp>
+      <p:sp>
+        <p:nvSpPr>
+          <p:cNvPr id="3" name="TextBox 2">
+            <a:extLst>
+              <a:ext uri="{FF2B5EF4-FFF2-40B4-BE49-F238E27FC236}">
+                <a16:creationId xmlns:a16="http://schemas.microsoft.com/office/drawing/2014/main" id="{231E173A-997F-3002-C4B1-8942B4943570}"/>
+              </a:ext>
+            </a:extLst>
+          </p:cNvPr>
+          <p:cNvSpPr txBox="1"/>
+          <p:nvPr/>
+        </p:nvSpPr>
+        <p:spPr>
+          <a:xfrm>
+            <a:off x="1694180" y="2214880"/>
+            <a:ext cx="8803640" cy="3785652"/>
+          </a:xfrm>
+          <a:prstGeom prst="rect">
+            <a:avLst/>
+          </a:prstGeom>
+          <a:noFill/>
+        </p:spPr>
+        <p:txBody>
+          <a:bodyPr wrap="square" rtlCol="0">
+            <a:spAutoFit/>
+          </a:bodyPr>
+          <a:lstStyle/>
+          <a:p>
+            <a:pPr marL="285750" indent="-285750">
+              <a:buFont typeface="Arial" panose="020B0604020202020204" pitchFamily="34" charset="0"/>
+              <a:buChar char="•"/>
+            </a:pPr>
+            <a:r>
+              <a:rPr lang="en-US" sz="2400" dirty="0"/>
+              <a:t>Test</a:t>
+            </a:r>
+          </a:p>
+          <a:p>
+            <a:pPr marL="285750" indent="-285750">
+              <a:buFont typeface="Arial" panose="020B0604020202020204" pitchFamily="34" charset="0"/>
+              <a:buChar char="•"/>
+            </a:pPr>
+            <a:r>
+              <a:rPr lang="en-US" sz="2400" dirty="0"/>
+              <a:t>Test</a:t>
+            </a:r>
+          </a:p>
+          <a:p>
+            <a:pPr marL="285750" indent="-285750">
+              <a:buFont typeface="Arial" panose="020B0604020202020204" pitchFamily="34" charset="0"/>
+              <a:buChar char="•"/>
+            </a:pPr>
+            <a:r>
+              <a:rPr lang="en-US" sz="2400" dirty="0"/>
+              <a:t>Test</a:t>
+            </a:r>
+          </a:p>
+          <a:p>
+            <a:pPr marL="285750" indent="-285750">
+              <a:buFont typeface="Arial" panose="020B0604020202020204" pitchFamily="34" charset="0"/>
+              <a:buChar char="•"/>
+            </a:pPr>
+            <a:r>
+              <a:rPr lang="en-US" sz="2400" dirty="0"/>
+              <a:t>Test</a:t>
+            </a:r>
+          </a:p>
+          <a:p>
+            <a:pPr marL="285750" indent="-285750">
+              <a:buFont typeface="Arial" panose="020B0604020202020204" pitchFamily="34" charset="0"/>
+              <a:buChar char="•"/>
+            </a:pPr>
+            <a:r>
+              <a:rPr lang="en-US" sz="2400" dirty="0"/>
+              <a:t>Test</a:t>
+            </a:r>
+          </a:p>
+          <a:p>
+            <a:pPr marL="285750" indent="-285750">
+              <a:buFont typeface="Arial" panose="020B0604020202020204" pitchFamily="34" charset="0"/>
+              <a:buChar char="•"/>
+            </a:pPr>
+            <a:r>
+              <a:rPr lang="en-US" sz="2400" dirty="0"/>
+              <a:t>Test</a:t>
+            </a:r>
+          </a:p>
+          <a:p>
+            <a:pPr marL="285750" indent="-285750">
+              <a:buFont typeface="Arial" panose="020B0604020202020204" pitchFamily="34" charset="0"/>
+              <a:buChar char="•"/>
+            </a:pPr>
+            <a:r>
+              <a:rPr lang="en-US" sz="2400" dirty="0"/>
+              <a:t>Test</a:t>
+            </a:r>
+          </a:p>
+          <a:p>
+            <a:pPr marL="285750" indent="-285750">
+              <a:buFont typeface="Arial" panose="020B0604020202020204" pitchFamily="34" charset="0"/>
+              <a:buChar char="•"/>
+            </a:pPr>
+            <a:r>
+              <a:rPr lang="en-US" sz="2400" dirty="0"/>
+              <a:t>Test</a:t>
+            </a:r>
+          </a:p>
+          <a:p>
+            <a:pPr marL="285750" indent="-285750">
+              <a:buFont typeface="Arial" panose="020B0604020202020204" pitchFamily="34" charset="0"/>
+              <a:buChar char="•"/>
+            </a:pPr>
+            <a:r>
+              <a:rPr lang="en-US" sz="2400" dirty="0"/>
+              <a:t>Test</a:t>
+            </a:r>
+          </a:p>
+          <a:p>
+            <a:endParaRPr lang="en-US" sz="2400" dirty="0"/>
           </a:p>
         </p:txBody>
       </p:sp>

</xml_diff>